<commit_message>
update logo to README page
</commit_message>
<xml_diff>
--- a/figs/workflow.pptx
+++ b/figs/workflow.pptx
@@ -244,7 +244,7 @@
           <a:p>
             <a:fld id="{C415CA74-3952-BD4B-AE8D-88D35F82BC16}" type="datetimeFigureOut">
               <a:rPr lang="en-US" smtClean="0"/>
-              <a:t>9/30/20</a:t>
+              <a:t>1/28/21</a:t>
             </a:fld>
             <a:endParaRPr lang="en-US"/>
           </a:p>
@@ -414,7 +414,7 @@
           <a:p>
             <a:fld id="{C415CA74-3952-BD4B-AE8D-88D35F82BC16}" type="datetimeFigureOut">
               <a:rPr lang="en-US" smtClean="0"/>
-              <a:t>9/30/20</a:t>
+              <a:t>1/28/21</a:t>
             </a:fld>
             <a:endParaRPr lang="en-US"/>
           </a:p>
@@ -594,7 +594,7 @@
           <a:p>
             <a:fld id="{C415CA74-3952-BD4B-AE8D-88D35F82BC16}" type="datetimeFigureOut">
               <a:rPr lang="en-US" smtClean="0"/>
-              <a:t>9/30/20</a:t>
+              <a:t>1/28/21</a:t>
             </a:fld>
             <a:endParaRPr lang="en-US"/>
           </a:p>
@@ -764,7 +764,7 @@
           <a:p>
             <a:fld id="{C415CA74-3952-BD4B-AE8D-88D35F82BC16}" type="datetimeFigureOut">
               <a:rPr lang="en-US" smtClean="0"/>
-              <a:t>9/30/20</a:t>
+              <a:t>1/28/21</a:t>
             </a:fld>
             <a:endParaRPr lang="en-US"/>
           </a:p>
@@ -1008,7 +1008,7 @@
           <a:p>
             <a:fld id="{C415CA74-3952-BD4B-AE8D-88D35F82BC16}" type="datetimeFigureOut">
               <a:rPr lang="en-US" smtClean="0"/>
-              <a:t>9/30/20</a:t>
+              <a:t>1/28/21</a:t>
             </a:fld>
             <a:endParaRPr lang="en-US"/>
           </a:p>
@@ -1240,7 +1240,7 @@
           <a:p>
             <a:fld id="{C415CA74-3952-BD4B-AE8D-88D35F82BC16}" type="datetimeFigureOut">
               <a:rPr lang="en-US" smtClean="0"/>
-              <a:t>9/30/20</a:t>
+              <a:t>1/28/21</a:t>
             </a:fld>
             <a:endParaRPr lang="en-US"/>
           </a:p>
@@ -1607,7 +1607,7 @@
           <a:p>
             <a:fld id="{C415CA74-3952-BD4B-AE8D-88D35F82BC16}" type="datetimeFigureOut">
               <a:rPr lang="en-US" smtClean="0"/>
-              <a:t>9/30/20</a:t>
+              <a:t>1/28/21</a:t>
             </a:fld>
             <a:endParaRPr lang="en-US"/>
           </a:p>
@@ -1725,7 +1725,7 @@
           <a:p>
             <a:fld id="{C415CA74-3952-BD4B-AE8D-88D35F82BC16}" type="datetimeFigureOut">
               <a:rPr lang="en-US" smtClean="0"/>
-              <a:t>9/30/20</a:t>
+              <a:t>1/28/21</a:t>
             </a:fld>
             <a:endParaRPr lang="en-US"/>
           </a:p>
@@ -1820,7 +1820,7 @@
           <a:p>
             <a:fld id="{C415CA74-3952-BD4B-AE8D-88D35F82BC16}" type="datetimeFigureOut">
               <a:rPr lang="en-US" smtClean="0"/>
-              <a:t>9/30/20</a:t>
+              <a:t>1/28/21</a:t>
             </a:fld>
             <a:endParaRPr lang="en-US"/>
           </a:p>
@@ -2097,7 +2097,7 @@
           <a:p>
             <a:fld id="{C415CA74-3952-BD4B-AE8D-88D35F82BC16}" type="datetimeFigureOut">
               <a:rPr lang="en-US" smtClean="0"/>
-              <a:t>9/30/20</a:t>
+              <a:t>1/28/21</a:t>
             </a:fld>
             <a:endParaRPr lang="en-US"/>
           </a:p>
@@ -2354,7 +2354,7 @@
           <a:p>
             <a:fld id="{C415CA74-3952-BD4B-AE8D-88D35F82BC16}" type="datetimeFigureOut">
               <a:rPr lang="en-US" smtClean="0"/>
-              <a:t>9/30/20</a:t>
+              <a:t>1/28/21</a:t>
             </a:fld>
             <a:endParaRPr lang="en-US"/>
           </a:p>
@@ -2567,7 +2567,7 @@
           <a:p>
             <a:fld id="{C415CA74-3952-BD4B-AE8D-88D35F82BC16}" type="datetimeFigureOut">
               <a:rPr lang="en-US" smtClean="0"/>
-              <a:t>9/30/20</a:t>
+              <a:t>1/28/21</a:t>
             </a:fld>
             <a:endParaRPr lang="en-US"/>
           </a:p>
@@ -4655,37 +4655,37 @@
             </a:extLst>
           </p:spPr>
         </p:pic>
-        <p:pic>
-          <p:nvPicPr>
-            <p:cNvPr id="5" name="Picture 4" descr="A close up of a logo&#10;&#10;Description automatically generated">
-              <a:extLst>
-                <a:ext uri="{FF2B5EF4-FFF2-40B4-BE49-F238E27FC236}">
-                  <a16:creationId xmlns:a16="http://schemas.microsoft.com/office/drawing/2014/main" id="{BE6B8959-2FB8-BE49-BFB9-B0678B847F28}"/>
-                </a:ext>
-              </a:extLst>
-            </p:cNvPr>
-            <p:cNvPicPr>
-              <a:picLocks noChangeAspect="1"/>
-            </p:cNvPicPr>
-            <p:nvPr/>
-          </p:nvPicPr>
-          <p:blipFill>
-            <a:blip r:embed="rId14"/>
-            <a:stretch>
-              <a:fillRect/>
-            </a:stretch>
-          </p:blipFill>
-          <p:spPr>
-            <a:xfrm>
-              <a:off x="750327" y="651624"/>
-              <a:ext cx="2152515" cy="2152515"/>
-            </a:xfrm>
-            <a:prstGeom prst="rect">
-              <a:avLst/>
-            </a:prstGeom>
-          </p:spPr>
-        </p:pic>
       </p:grpSp>
+      <p:pic>
+        <p:nvPicPr>
+          <p:cNvPr id="10" name="Picture 9" descr="Logo&#10;&#10;Description automatically generated">
+            <a:extLst>
+              <a:ext uri="{FF2B5EF4-FFF2-40B4-BE49-F238E27FC236}">
+                <a16:creationId xmlns:a16="http://schemas.microsoft.com/office/drawing/2014/main" id="{63A1423B-2CDE-4A45-9C77-22DF9D64199B}"/>
+              </a:ext>
+            </a:extLst>
+          </p:cNvPr>
+          <p:cNvPicPr>
+            <a:picLocks noChangeAspect="1"/>
+          </p:cNvPicPr>
+          <p:nvPr/>
+        </p:nvPicPr>
+        <p:blipFill>
+          <a:blip r:embed="rId14"/>
+          <a:stretch>
+            <a:fillRect/>
+          </a:stretch>
+        </p:blipFill>
+        <p:spPr>
+          <a:xfrm>
+            <a:off x="1283292" y="2313753"/>
+            <a:ext cx="2410650" cy="1279728"/>
+          </a:xfrm>
+          <a:prstGeom prst="rect">
+            <a:avLst/>
+          </a:prstGeom>
+        </p:spPr>
+      </p:pic>
     </p:spTree>
     <p:extLst>
       <p:ext uri="{BB962C8B-B14F-4D97-AF65-F5344CB8AC3E}">

</xml_diff>